<commit_message>
updates to framework section
</commit_message>
<xml_diff>
--- a/docs/CDC 2017 Safe Tracking/fig/framework_offline.pptx
+++ b/docs/CDC 2017 Safe Tracking/fig/framework_offline.pptx
@@ -243,7 +243,7 @@
           <a:p>
             <a:fld id="{C48BF103-B019-4C03-B7DF-16D4A730CE6A}" type="datetimeFigureOut">
               <a:rPr lang="en-US" smtClean="0"/>
-              <a:t>17/03/02</a:t>
+              <a:t>3/15/17</a:t>
             </a:fld>
             <a:endParaRPr lang="en-US"/>
           </a:p>
@@ -413,7 +413,7 @@
           <a:p>
             <a:fld id="{C48BF103-B019-4C03-B7DF-16D4A730CE6A}" type="datetimeFigureOut">
               <a:rPr lang="en-US" smtClean="0"/>
-              <a:t>17/03/02</a:t>
+              <a:t>3/15/17</a:t>
             </a:fld>
             <a:endParaRPr lang="en-US"/>
           </a:p>
@@ -593,7 +593,7 @@
           <a:p>
             <a:fld id="{C48BF103-B019-4C03-B7DF-16D4A730CE6A}" type="datetimeFigureOut">
               <a:rPr lang="en-US" smtClean="0"/>
-              <a:t>17/03/02</a:t>
+              <a:t>3/15/17</a:t>
             </a:fld>
             <a:endParaRPr lang="en-US"/>
           </a:p>
@@ -763,7 +763,7 @@
           <a:p>
             <a:fld id="{C48BF103-B019-4C03-B7DF-16D4A730CE6A}" type="datetimeFigureOut">
               <a:rPr lang="en-US" smtClean="0"/>
-              <a:t>17/03/02</a:t>
+              <a:t>3/15/17</a:t>
             </a:fld>
             <a:endParaRPr lang="en-US"/>
           </a:p>
@@ -1009,7 +1009,7 @@
           <a:p>
             <a:fld id="{C48BF103-B019-4C03-B7DF-16D4A730CE6A}" type="datetimeFigureOut">
               <a:rPr lang="en-US" smtClean="0"/>
-              <a:t>17/03/02</a:t>
+              <a:t>3/15/17</a:t>
             </a:fld>
             <a:endParaRPr lang="en-US"/>
           </a:p>
@@ -1241,7 +1241,7 @@
           <a:p>
             <a:fld id="{C48BF103-B019-4C03-B7DF-16D4A730CE6A}" type="datetimeFigureOut">
               <a:rPr lang="en-US" smtClean="0"/>
-              <a:t>17/03/02</a:t>
+              <a:t>3/15/17</a:t>
             </a:fld>
             <a:endParaRPr lang="en-US"/>
           </a:p>
@@ -1608,7 +1608,7 @@
           <a:p>
             <a:fld id="{C48BF103-B019-4C03-B7DF-16D4A730CE6A}" type="datetimeFigureOut">
               <a:rPr lang="en-US" smtClean="0"/>
-              <a:t>17/03/02</a:t>
+              <a:t>3/15/17</a:t>
             </a:fld>
             <a:endParaRPr lang="en-US"/>
           </a:p>
@@ -1726,7 +1726,7 @@
           <a:p>
             <a:fld id="{C48BF103-B019-4C03-B7DF-16D4A730CE6A}" type="datetimeFigureOut">
               <a:rPr lang="en-US" smtClean="0"/>
-              <a:t>17/03/02</a:t>
+              <a:t>3/15/17</a:t>
             </a:fld>
             <a:endParaRPr lang="en-US"/>
           </a:p>
@@ -1821,7 +1821,7 @@
           <a:p>
             <a:fld id="{C48BF103-B019-4C03-B7DF-16D4A730CE6A}" type="datetimeFigureOut">
               <a:rPr lang="en-US" smtClean="0"/>
-              <a:t>17/03/02</a:t>
+              <a:t>3/15/17</a:t>
             </a:fld>
             <a:endParaRPr lang="en-US"/>
           </a:p>
@@ -2098,7 +2098,7 @@
           <a:p>
             <a:fld id="{C48BF103-B019-4C03-B7DF-16D4A730CE6A}" type="datetimeFigureOut">
               <a:rPr lang="en-US" smtClean="0"/>
-              <a:t>17/03/02</a:t>
+              <a:t>3/15/17</a:t>
             </a:fld>
             <a:endParaRPr lang="en-US"/>
           </a:p>
@@ -2355,7 +2355,7 @@
           <a:p>
             <a:fld id="{C48BF103-B019-4C03-B7DF-16D4A730CE6A}" type="datetimeFigureOut">
               <a:rPr lang="en-US" smtClean="0"/>
-              <a:t>17/03/02</a:t>
+              <a:t>3/15/17</a:t>
             </a:fld>
             <a:endParaRPr lang="en-US"/>
           </a:p>
@@ -2568,7 +2568,7 @@
           <a:p>
             <a:fld id="{C48BF103-B019-4C03-B7DF-16D4A730CE6A}" type="datetimeFigureOut">
               <a:rPr lang="en-US" smtClean="0"/>
-              <a:t>17/03/02</a:t>
+              <a:t>3/15/17</a:t>
             </a:fld>
             <a:endParaRPr lang="en-US"/>
           </a:p>
@@ -2996,7 +2996,7 @@
           <p:spPr>
             <a:xfrm>
               <a:off x="149032" y="1071724"/>
-              <a:ext cx="1068513" cy="914400"/>
+              <a:ext cx="1075467" cy="914400"/>
             </a:xfrm>
             <a:prstGeom prst="roundRect">
               <a:avLst/>
@@ -3022,9 +3022,10 @@
             <a:p>
               <a:pPr algn="ctr"/>
               <a:r>
-                <a:rPr lang="en-US" dirty="0"/>
-                <a:t>Virtual system</a:t>
+                <a:rPr lang="en-US" dirty="0" smtClean="0"/>
+                <a:t>Planning system</a:t>
               </a:r>
+              <a:endParaRPr lang="en-US" dirty="0"/>
             </a:p>
           </p:txBody>
         </p:sp>
@@ -3063,13 +3064,10 @@
             <a:p>
               <a:pPr algn="ctr"/>
               <a:r>
-                <a:rPr lang="en-US"/>
-                <a:t>Real </a:t>
+                <a:rPr lang="en-US" dirty="0" smtClean="0"/>
+                <a:t>Tracking system</a:t>
               </a:r>
-              <a:r>
-                <a:rPr lang="en-US" dirty="0"/>
-                <a:t>system</a:t>
-              </a:r>
+              <a:endParaRPr lang="en-US" dirty="0"/>
             </a:p>
           </p:txBody>
         </p:sp>
@@ -3291,12 +3289,16 @@
             <a:p>
               <a:pPr algn="ctr"/>
               <a:r>
-                <a:rPr lang="en-US" sz="1600" dirty="0">
+                <a:rPr lang="en-US" sz="1600" dirty="0" smtClean="0">
                   <a:latin typeface="Times New Roman" panose="02020603050405020304" pitchFamily="18" charset="0"/>
                   <a:cs typeface="Times New Roman" panose="02020603050405020304" pitchFamily="18" charset="0"/>
                 </a:rPr>
-                <a:t>Real dynamics</a:t>
+                <a:t>Tracking dynamics</a:t>
               </a:r>
+              <a:endParaRPr lang="en-US" sz="1600" dirty="0">
+                <a:latin typeface="Times New Roman" panose="02020603050405020304" pitchFamily="18" charset="0"/>
+                <a:cs typeface="Times New Roman" panose="02020603050405020304" pitchFamily="18" charset="0"/>
+              </a:endParaRPr>
             </a:p>
           </p:txBody>
         </p:sp>
@@ -3324,12 +3326,16 @@
             <a:p>
               <a:pPr algn="ctr"/>
               <a:r>
-                <a:rPr lang="en-US" sz="1600" dirty="0">
+                <a:rPr lang="en-US" sz="1600" dirty="0" smtClean="0">
                   <a:latin typeface="Times New Roman" panose="02020603050405020304" pitchFamily="18" charset="0"/>
                   <a:cs typeface="Times New Roman" panose="02020603050405020304" pitchFamily="18" charset="0"/>
                 </a:rPr>
-                <a:t>Virtual dynamics</a:t>
+                <a:t>Planning dynamics</a:t>
               </a:r>
+              <a:endParaRPr lang="en-US" sz="1600" dirty="0">
+                <a:latin typeface="Times New Roman" panose="02020603050405020304" pitchFamily="18" charset="0"/>
+                <a:cs typeface="Times New Roman" panose="02020603050405020304" pitchFamily="18" charset="0"/>
+              </a:endParaRPr>
             </a:p>
           </p:txBody>
         </p:sp>

</xml_diff>